<commit_message>
Updated the presentation and added comments to the data_cleaner
</commit_message>
<xml_diff>
--- a/docs/Olympic Basketball.pptx
+++ b/docs/Olympic Basketball.pptx
@@ -141,12 +141,12 @@
   <pc:docChgLst>
     <pc:chgData name="Robert Hugh Riddell" userId="10b8bca60ec8b3c5" providerId="LiveId" clId="{7E891DE8-2BDD-41FB-AA5F-371F2ACDF2ED}"/>
     <pc:docChg chg="undo custSel addSld modSld sldOrd">
-      <pc:chgData name="Robert Hugh Riddell" userId="10b8bca60ec8b3c5" providerId="LiveId" clId="{7E891DE8-2BDD-41FB-AA5F-371F2ACDF2ED}" dt="2021-08-10T23:29:29.253" v="229" actId="20577"/>
+      <pc:chgData name="Robert Hugh Riddell" userId="10b8bca60ec8b3c5" providerId="LiveId" clId="{7E891DE8-2BDD-41FB-AA5F-371F2ACDF2ED}" dt="2021-08-11T03:59:16.825" v="352" actId="20577"/>
       <pc:docMkLst>
         <pc:docMk/>
       </pc:docMkLst>
       <pc:sldChg chg="modSp mod">
-        <pc:chgData name="Robert Hugh Riddell" userId="10b8bca60ec8b3c5" providerId="LiveId" clId="{7E891DE8-2BDD-41FB-AA5F-371F2ACDF2ED}" dt="2021-08-10T23:29:29.253" v="229" actId="20577"/>
+        <pc:chgData name="Robert Hugh Riddell" userId="10b8bca60ec8b3c5" providerId="LiveId" clId="{7E891DE8-2BDD-41FB-AA5F-371F2ACDF2ED}" dt="2021-08-11T02:38:59.848" v="231" actId="1076"/>
         <pc:sldMkLst>
           <pc:docMk/>
           <pc:sldMk cId="3209674386" sldId="256"/>
@@ -159,15 +159,38 @@
             <ac:spMk id="2" creationId="{6CC84052-797F-44D1-983F-CF05C347ACAC}"/>
           </ac:spMkLst>
         </pc:spChg>
+        <pc:spChg chg="mod">
+          <ac:chgData name="Robert Hugh Riddell" userId="10b8bca60ec8b3c5" providerId="LiveId" clId="{7E891DE8-2BDD-41FB-AA5F-371F2ACDF2ED}" dt="2021-08-11T02:38:59.848" v="231" actId="1076"/>
+          <ac:spMkLst>
+            <pc:docMk/>
+            <pc:sldMk cId="3209674386" sldId="256"/>
+            <ac:spMk id="3" creationId="{2B5ED05D-B2E7-41DB-9AF9-E7CF891F09C9}"/>
+          </ac:spMkLst>
+        </pc:spChg>
       </pc:sldChg>
       <pc:sldChg chg="modSp mod">
-        <pc:chgData name="Robert Hugh Riddell" userId="10b8bca60ec8b3c5" providerId="LiveId" clId="{7E891DE8-2BDD-41FB-AA5F-371F2ACDF2ED}" dt="2021-08-10T23:22:27.320" v="194" actId="20577"/>
+        <pc:chgData name="Robert Hugh Riddell" userId="10b8bca60ec8b3c5" providerId="LiveId" clId="{7E891DE8-2BDD-41FB-AA5F-371F2ACDF2ED}" dt="2021-08-11T03:54:06.706" v="278" actId="20577"/>
+        <pc:sldMkLst>
+          <pc:docMk/>
+          <pc:sldMk cId="3465445200" sldId="257"/>
+        </pc:sldMkLst>
+        <pc:spChg chg="mod">
+          <ac:chgData name="Robert Hugh Riddell" userId="10b8bca60ec8b3c5" providerId="LiveId" clId="{7E891DE8-2BDD-41FB-AA5F-371F2ACDF2ED}" dt="2021-08-11T03:54:06.706" v="278" actId="20577"/>
+          <ac:spMkLst>
+            <pc:docMk/>
+            <pc:sldMk cId="3465445200" sldId="257"/>
+            <ac:spMk id="3" creationId="{07846504-26BC-465E-B9E2-ADD97B45FD6B}"/>
+          </ac:spMkLst>
+        </pc:spChg>
+      </pc:sldChg>
+      <pc:sldChg chg="modSp mod">
+        <pc:chgData name="Robert Hugh Riddell" userId="10b8bca60ec8b3c5" providerId="LiveId" clId="{7E891DE8-2BDD-41FB-AA5F-371F2ACDF2ED}" dt="2021-08-11T03:55:48.436" v="330" actId="20577"/>
         <pc:sldMkLst>
           <pc:docMk/>
           <pc:sldMk cId="572762935" sldId="258"/>
         </pc:sldMkLst>
         <pc:spChg chg="mod">
-          <ac:chgData name="Robert Hugh Riddell" userId="10b8bca60ec8b3c5" providerId="LiveId" clId="{7E891DE8-2BDD-41FB-AA5F-371F2ACDF2ED}" dt="2021-08-10T23:22:27.320" v="194" actId="20577"/>
+          <ac:chgData name="Robert Hugh Riddell" userId="10b8bca60ec8b3c5" providerId="LiveId" clId="{7E891DE8-2BDD-41FB-AA5F-371F2ACDF2ED}" dt="2021-08-11T03:55:48.436" v="330" actId="20577"/>
           <ac:spMkLst>
             <pc:docMk/>
             <pc:sldMk cId="572762935" sldId="258"/>
@@ -206,13 +229,13 @@
         </pc:spChg>
       </pc:sldChg>
       <pc:sldChg chg="modSp mod ord">
-        <pc:chgData name="Robert Hugh Riddell" userId="10b8bca60ec8b3c5" providerId="LiveId" clId="{7E891DE8-2BDD-41FB-AA5F-371F2ACDF2ED}" dt="2021-08-10T23:29:21.440" v="209"/>
+        <pc:chgData name="Robert Hugh Riddell" userId="10b8bca60ec8b3c5" providerId="LiveId" clId="{7E891DE8-2BDD-41FB-AA5F-371F2ACDF2ED}" dt="2021-08-11T03:59:16.825" v="352" actId="20577"/>
         <pc:sldMkLst>
           <pc:docMk/>
           <pc:sldMk cId="4204713045" sldId="261"/>
         </pc:sldMkLst>
         <pc:spChg chg="mod">
-          <ac:chgData name="Robert Hugh Riddell" userId="10b8bca60ec8b3c5" providerId="LiveId" clId="{7E891DE8-2BDD-41FB-AA5F-371F2ACDF2ED}" dt="2021-08-10T23:29:12.177" v="207" actId="20577"/>
+          <ac:chgData name="Robert Hugh Riddell" userId="10b8bca60ec8b3c5" providerId="LiveId" clId="{7E891DE8-2BDD-41FB-AA5F-371F2ACDF2ED}" dt="2021-08-11T03:59:16.825" v="352" actId="20577"/>
           <ac:spMkLst>
             <pc:docMk/>
             <pc:sldMk cId="4204713045" sldId="261"/>
@@ -221,13 +244,13 @@
         </pc:spChg>
       </pc:sldChg>
       <pc:sldChg chg="modSp mod">
-        <pc:chgData name="Robert Hugh Riddell" userId="10b8bca60ec8b3c5" providerId="LiveId" clId="{7E891DE8-2BDD-41FB-AA5F-371F2ACDF2ED}" dt="2021-08-10T23:10:22.173" v="116" actId="20577"/>
+        <pc:chgData name="Robert Hugh Riddell" userId="10b8bca60ec8b3c5" providerId="LiveId" clId="{7E891DE8-2BDD-41FB-AA5F-371F2ACDF2ED}" dt="2021-08-11T03:57:33.640" v="333" actId="20577"/>
         <pc:sldMkLst>
           <pc:docMk/>
           <pc:sldMk cId="1426936972" sldId="262"/>
         </pc:sldMkLst>
         <pc:spChg chg="mod">
-          <ac:chgData name="Robert Hugh Riddell" userId="10b8bca60ec8b3c5" providerId="LiveId" clId="{7E891DE8-2BDD-41FB-AA5F-371F2ACDF2ED}" dt="2021-08-10T23:10:22.173" v="116" actId="20577"/>
+          <ac:chgData name="Robert Hugh Riddell" userId="10b8bca60ec8b3c5" providerId="LiveId" clId="{7E891DE8-2BDD-41FB-AA5F-371F2ACDF2ED}" dt="2021-08-11T03:57:33.640" v="333" actId="20577"/>
           <ac:spMkLst>
             <pc:docMk/>
             <pc:sldMk cId="1426936972" sldId="262"/>
@@ -236,11 +259,19 @@
         </pc:spChg>
       </pc:sldChg>
       <pc:sldChg chg="modSp mod">
-        <pc:chgData name="Robert Hugh Riddell" userId="10b8bca60ec8b3c5" providerId="LiveId" clId="{7E891DE8-2BDD-41FB-AA5F-371F2ACDF2ED}" dt="2021-08-10T23:03:50.738" v="6" actId="1076"/>
+        <pc:chgData name="Robert Hugh Riddell" userId="10b8bca60ec8b3c5" providerId="LiveId" clId="{7E891DE8-2BDD-41FB-AA5F-371F2ACDF2ED}" dt="2021-08-11T03:58:10.748" v="334" actId="20577"/>
         <pc:sldMkLst>
           <pc:docMk/>
           <pc:sldMk cId="766201651" sldId="263"/>
         </pc:sldMkLst>
+        <pc:spChg chg="mod">
+          <ac:chgData name="Robert Hugh Riddell" userId="10b8bca60ec8b3c5" providerId="LiveId" clId="{7E891DE8-2BDD-41FB-AA5F-371F2ACDF2ED}" dt="2021-08-11T03:58:10.748" v="334" actId="20577"/>
+          <ac:spMkLst>
+            <pc:docMk/>
+            <pc:sldMk cId="766201651" sldId="263"/>
+            <ac:spMk id="3" creationId="{7E9DEA4C-D4A9-46A4-B315-27A869C8755F}"/>
+          </ac:spMkLst>
+        </pc:spChg>
         <pc:graphicFrameChg chg="mod">
           <ac:chgData name="Robert Hugh Riddell" userId="10b8bca60ec8b3c5" providerId="LiveId" clId="{7E891DE8-2BDD-41FB-AA5F-371F2ACDF2ED}" dt="2021-08-10T23:03:50.738" v="6" actId="1076"/>
           <ac:graphicFrameMkLst>
@@ -4006,7 +4037,7 @@
           <a:bodyPr/>
           <a:lstStyle/>
           <a:p>
-            <a:endParaRPr lang="en-AU"/>
+            <a:endParaRPr lang="en-AU" dirty="0"/>
           </a:p>
         </p:txBody>
       </p:sp>
@@ -4091,7 +4122,7 @@
           <a:p>
             <a:r>
               <a:rPr lang="en-AU" dirty="0"/>
-              <a:t>using a the classification algorithms decision tree, random forest and logistic regression the win loss was predicted </a:t>
+              <a:t>using a the classification algorithms: decision tree, random forest and logistic regression the win loss was predicted </a:t>
             </a:r>
           </a:p>
           <a:p>
@@ -4704,7 +4735,7 @@
           <a:p>
             <a:r>
               <a:rPr lang="en-AU" dirty="0"/>
-              <a:t>Analysis of the domestic leagues the medal winning players compete in</a:t>
+              <a:t>Analysis of the domestic leagues that the medal winning players compete in</a:t>
             </a:r>
           </a:p>
           <a:p>
@@ -4723,7 +4754,7 @@
           <a:p>
             <a:r>
               <a:rPr lang="en-AU" dirty="0"/>
-              <a:t>Does Junior international success translate to senior success. </a:t>
+              <a:t>Does Junior international success translate to senior success?</a:t>
             </a:r>
           </a:p>
           <a:p>
@@ -4932,13 +4963,13 @@
           <a:p>
             <a:r>
               <a:rPr lang="en-AU" dirty="0"/>
-              <a:t>Data Scraped from Basketball Reference. Taken as player box scores then combined. </a:t>
+              <a:t>Data scraped from Basketball Reference as player box scores, then combined. </a:t>
             </a:r>
           </a:p>
           <a:p>
             <a:r>
               <a:rPr lang="en-AU" dirty="0"/>
-              <a:t>Olympic Games 2000 – 2016 containing 198 games</a:t>
+              <a:t>Olympic Games 2000 – 2016 (198 games)</a:t>
             </a:r>
           </a:p>
           <a:p>
@@ -4948,27 +4979,27 @@
             </a:r>
             <a:r>
               <a:rPr lang="en-AU" dirty="0"/>
-              <a:t> World Cup 2010,2014 and 2019 containing 248 games</a:t>
+              <a:t> World Cup 2010, 2014 and 2019 (248 games)</a:t>
             </a:r>
           </a:p>
           <a:p>
             <a:r>
               <a:rPr lang="en-AU" dirty="0"/>
-              <a:t>total of 448 games from 42 individual teams</a:t>
+              <a:t>Total of 448 games from 42 individual teams</a:t>
             </a:r>
           </a:p>
           <a:p>
             <a:pPr lvl="1"/>
             <a:r>
               <a:rPr lang="en-AU" dirty="0"/>
-              <a:t>minimum games played 5</a:t>
+              <a:t>minimum games played = 5</a:t>
             </a:r>
           </a:p>
           <a:p>
             <a:pPr lvl="1"/>
             <a:r>
               <a:rPr lang="en-AU" dirty="0"/>
-              <a:t>maximum played 66	</a:t>
+              <a:t>maximum played = 66	</a:t>
             </a:r>
           </a:p>
           <a:p>
@@ -5072,25 +5103,25 @@
           <a:p>
             <a:r>
               <a:rPr lang="en-AU" dirty="0"/>
-              <a:t>Assess the statistical similarity teams that have a top 4 finish</a:t>
+              <a:t>Assess the statistical similarity between teams that have a top 4 finish</a:t>
             </a:r>
           </a:p>
           <a:p>
             <a:r>
               <a:rPr lang="en-AU" dirty="0"/>
-              <a:t>Build multiple models to predict points scored based on statistics provided and compare</a:t>
+              <a:t>Build multiple models to predict points scored </a:t>
             </a:r>
           </a:p>
           <a:p>
             <a:r>
               <a:rPr lang="en-AU" dirty="0"/>
-              <a:t>Build multiple model to predict the outcome of the game based on statistics provided and compare</a:t>
+              <a:t>Build multiple model to predict the outcome of the game </a:t>
             </a:r>
           </a:p>
           <a:p>
             <a:r>
               <a:rPr lang="en-AU" dirty="0"/>
-              <a:t>Analyse the results and what statistics are valuable in predicting performance.</a:t>
+              <a:t>Analyse the results to determine which statistics are valuable in predicting performance</a:t>
             </a:r>
           </a:p>
           <a:p>
@@ -6916,15 +6947,7 @@
           <a:p>
             <a:r>
               <a:rPr lang="en-AU" dirty="0"/>
-              <a:t>explain the RMSE and </a:t>
-            </a:r>
-            <a:r>
-              <a:rPr lang="en-AU" dirty="0" err="1"/>
-              <a:t>Rsqaured</a:t>
-            </a:r>
-            <a:r>
-              <a:rPr lang="en-AU" dirty="0"/>
-              <a:t> values </a:t>
+              <a:t>explain the RMSE and R-squared values </a:t>
             </a:r>
           </a:p>
           <a:p>

</xml_diff>